<commit_message>
update cholera map to 3D version
</commit_message>
<xml_diff>
--- a/Lectures/Lecture 6 - Molecular Epidemiology.pptx
+++ b/Lectures/Lecture 6 - Molecular Epidemiology.pptx
@@ -20451,7 +20451,15 @@
           <a:p>
             <a:r>
               <a:rPr lang="en-US" sz="1100" dirty="0"/>
-              <a:t>https://www.udel.edu/johnmack/frec682/cholera/cholera2.html</a:t>
+              <a:t>https://</a:t>
+            </a:r>
+            <a:r>
+              <a:rPr lang="en-US" sz="1100" dirty="0" err="1"/>
+              <a:t>ralucanicola.github.io</a:t>
+            </a:r>
+            <a:r>
+              <a:rPr lang="en-US" sz="1100" dirty="0"/>
+              <a:t>/cholera-map-3D </a:t>
             </a:r>
           </a:p>
         </p:txBody>

</xml_diff>

<commit_message>
finalize lectures 6 & 7
</commit_message>
<xml_diff>
--- a/Lectures/Lecture 6 - Molecular Epidemiology.pptx
+++ b/Lectures/Lecture 6 - Molecular Epidemiology.pptx
@@ -18185,150 +18185,150 @@
             <a:pPr algn="l" eaLnBrk="1" hangingPunct="1"/>
             <a:r>
               <a:rPr lang="en-US" sz="3200" b="1" dirty="0"/>
-              <a:t>Thursday’s Lab</a:t>
+              <a:t>Wednesday’s Lab</a:t>
             </a:r>
             <a:endParaRPr lang="en-US" sz="3200" dirty="0"/>
+          </a:p>
+        </p:txBody>
+      </p:sp>
+      <p:sp>
+        <p:nvSpPr>
+          <p:cNvPr id="7" name="TextBox 6"/>
+          <p:cNvSpPr txBox="1"/>
+          <p:nvPr/>
+        </p:nvSpPr>
+        <p:spPr>
+          <a:xfrm>
+            <a:off x="323528" y="1196752"/>
+            <a:ext cx="8352928" cy="1938992"/>
+          </a:xfrm>
+          <a:prstGeom prst="rect">
+            <a:avLst/>
+          </a:prstGeom>
+          <a:noFill/>
+          <a:ln>
+            <a:noFill/>
+          </a:ln>
+        </p:spPr>
+        <p:txBody>
+          <a:bodyPr wrap="square" rtlCol="0">
+            <a:spAutoFit/>
+          </a:bodyPr>
+          <a:lstStyle/>
+          <a:p>
+            <a:pPr marL="342900" indent="-342900">
+              <a:buFont typeface="Arial"/>
+              <a:buChar char="•"/>
+            </a:pPr>
+            <a:r>
+              <a:rPr lang="en-US" sz="2000" dirty="0"/>
+              <a:t>Examine a </a:t>
+            </a:r>
+            <a:r>
+              <a:rPr lang="en-US" sz="2000" i="1" dirty="0"/>
+              <a:t>Salmonella</a:t>
+            </a:r>
+            <a:r>
+              <a:rPr lang="en-US" sz="2000" dirty="0"/>
+              <a:t> outbreak using whole-genome sequencing &amp; assembly of isolates</a:t>
+            </a:r>
+          </a:p>
+          <a:p>
+            <a:pPr marL="342900" indent="-342900">
+              <a:buFont typeface="Arial"/>
+              <a:buChar char="•"/>
+            </a:pPr>
+            <a:r>
+              <a:rPr lang="en-US" sz="2000" dirty="0"/>
+              <a:t>MLST analysis</a:t>
+            </a:r>
+          </a:p>
+          <a:p>
+            <a:pPr marL="342900" indent="-342900">
+              <a:buFont typeface="Arial"/>
+              <a:buChar char="•"/>
+            </a:pPr>
+            <a:r>
+              <a:rPr lang="en-US" sz="2000" dirty="0"/>
+              <a:t>PARSNP &amp; </a:t>
+            </a:r>
+            <a:r>
+              <a:rPr lang="en-US" sz="2000" dirty="0" err="1"/>
+              <a:t>RAxML</a:t>
+            </a:r>
+            <a:r>
+              <a:rPr lang="en-US" sz="2000" dirty="0"/>
+              <a:t> analysis</a:t>
+            </a:r>
+          </a:p>
+          <a:p>
+            <a:pPr marL="342900" indent="-342900">
+              <a:buFont typeface="Arial"/>
+              <a:buChar char="•"/>
+            </a:pPr>
+            <a:r>
+              <a:rPr lang="en-US" sz="2000" dirty="0" err="1"/>
+              <a:t>Resistome</a:t>
+            </a:r>
+            <a:r>
+              <a:rPr lang="en-US" sz="2000" dirty="0"/>
+              <a:t> prediction based on genome sequences (i.e. CARD)</a:t>
+            </a:r>
+          </a:p>
+          <a:p>
+            <a:pPr marL="342900" indent="-342900">
+              <a:buFont typeface="Arial"/>
+              <a:buChar char="•"/>
+            </a:pPr>
+            <a:r>
+              <a:rPr lang="en-US" sz="2000" dirty="0" err="1"/>
+              <a:t>Resistome</a:t>
+            </a:r>
+            <a:r>
+              <a:rPr lang="en-US" sz="2000" dirty="0"/>
+              <a:t> prediction based on </a:t>
+            </a:r>
+            <a:r>
+              <a:rPr lang="en-US" sz="2000" dirty="0" err="1"/>
+              <a:t>metagenomic</a:t>
+            </a:r>
+            <a:r>
+              <a:rPr lang="en-US" sz="2000" dirty="0"/>
+              <a:t> sequencing</a:t>
+            </a:r>
           </a:p>
         </p:txBody>
       </p:sp>
       <p:pic>
         <p:nvPicPr>
-          <p:cNvPr id="6" name="Picture 5" descr="flash.jpg"/>
+          <p:cNvPr id="3" name="Picture 2">
+            <a:extLst>
+              <a:ext uri="{FF2B5EF4-FFF2-40B4-BE49-F238E27FC236}">
+                <a16:creationId xmlns:a16="http://schemas.microsoft.com/office/drawing/2014/main" id="{5A5D0CC0-9033-614D-A8C4-7A69A91EFC2B}"/>
+              </a:ext>
+            </a:extLst>
+          </p:cNvPr>
           <p:cNvPicPr>
             <a:picLocks noChangeAspect="1"/>
           </p:cNvPicPr>
           <p:nvPr/>
         </p:nvPicPr>
         <p:blipFill>
-          <a:blip r:embed="rId3">
-            <a:extLst>
-              <a:ext uri="{28A0092B-C50C-407E-A947-70E740481C1C}">
-                <a14:useLocalDpi xmlns:a14="http://schemas.microsoft.com/office/drawing/2010/main" val="0"/>
-              </a:ext>
-            </a:extLst>
-          </a:blip>
+          <a:blip r:embed="rId3"/>
           <a:stretch>
             <a:fillRect/>
           </a:stretch>
         </p:blipFill>
         <p:spPr>
           <a:xfrm>
-            <a:off x="323528" y="3573016"/>
-            <a:ext cx="8388424" cy="2459179"/>
+            <a:off x="485800" y="3441014"/>
+            <a:ext cx="8244408" cy="2277204"/>
           </a:xfrm>
           <a:prstGeom prst="rect">
             <a:avLst/>
           </a:prstGeom>
         </p:spPr>
       </p:pic>
-      <p:sp>
-        <p:nvSpPr>
-          <p:cNvPr id="7" name="TextBox 6"/>
-          <p:cNvSpPr txBox="1"/>
-          <p:nvPr/>
-        </p:nvSpPr>
-        <p:spPr>
-          <a:xfrm>
-            <a:off x="323528" y="1196752"/>
-            <a:ext cx="8352928" cy="1938992"/>
-          </a:xfrm>
-          <a:prstGeom prst="rect">
-            <a:avLst/>
-          </a:prstGeom>
-          <a:noFill/>
-          <a:ln>
-            <a:noFill/>
-          </a:ln>
-        </p:spPr>
-        <p:txBody>
-          <a:bodyPr wrap="square" rtlCol="0">
-            <a:spAutoFit/>
-          </a:bodyPr>
-          <a:lstStyle/>
-          <a:p>
-            <a:pPr marL="342900" indent="-342900">
-              <a:buFont typeface="Arial"/>
-              <a:buChar char="•"/>
-            </a:pPr>
-            <a:r>
-              <a:rPr lang="en-US" sz="2000" dirty="0"/>
-              <a:t>Examine a </a:t>
-            </a:r>
-            <a:r>
-              <a:rPr lang="en-US" sz="2000" i="1" dirty="0"/>
-              <a:t>Salmonella</a:t>
-            </a:r>
-            <a:r>
-              <a:rPr lang="en-US" sz="2000" dirty="0"/>
-              <a:t> outbreak using whole-genome sequencing &amp; assembly of isolates</a:t>
-            </a:r>
-          </a:p>
-          <a:p>
-            <a:pPr marL="342900" indent="-342900">
-              <a:buFont typeface="Arial"/>
-              <a:buChar char="•"/>
-            </a:pPr>
-            <a:r>
-              <a:rPr lang="en-US" sz="2000" dirty="0"/>
-              <a:t>MLST analysis</a:t>
-            </a:r>
-          </a:p>
-          <a:p>
-            <a:pPr marL="342900" indent="-342900">
-              <a:buFont typeface="Arial"/>
-              <a:buChar char="•"/>
-            </a:pPr>
-            <a:r>
-              <a:rPr lang="en-US" sz="2000" dirty="0"/>
-              <a:t>PARSNP &amp; </a:t>
-            </a:r>
-            <a:r>
-              <a:rPr lang="en-US" sz="2000" dirty="0" err="1"/>
-              <a:t>RAxML</a:t>
-            </a:r>
-            <a:r>
-              <a:rPr lang="en-US" sz="2000" dirty="0"/>
-              <a:t> analysis</a:t>
-            </a:r>
-          </a:p>
-          <a:p>
-            <a:pPr marL="342900" indent="-342900">
-              <a:buFont typeface="Arial"/>
-              <a:buChar char="•"/>
-            </a:pPr>
-            <a:r>
-              <a:rPr lang="en-US" sz="2000" dirty="0" err="1"/>
-              <a:t>Resistome</a:t>
-            </a:r>
-            <a:r>
-              <a:rPr lang="en-US" sz="2000" dirty="0"/>
-              <a:t> prediction based on genome sequences (i.e. CARD)</a:t>
-            </a:r>
-          </a:p>
-          <a:p>
-            <a:pPr marL="342900" indent="-342900">
-              <a:buFont typeface="Arial"/>
-              <a:buChar char="•"/>
-            </a:pPr>
-            <a:r>
-              <a:rPr lang="en-US" sz="2000" dirty="0" err="1"/>
-              <a:t>Resistome</a:t>
-            </a:r>
-            <a:r>
-              <a:rPr lang="en-US" sz="2000" dirty="0"/>
-              <a:t> prediction based on </a:t>
-            </a:r>
-            <a:r>
-              <a:rPr lang="en-US" sz="2000" dirty="0" err="1"/>
-              <a:t>metagenomic</a:t>
-            </a:r>
-            <a:r>
-              <a:rPr lang="en-US" sz="2000" dirty="0"/>
-              <a:t> sequencing</a:t>
-            </a:r>
-          </a:p>
-        </p:txBody>
-      </p:sp>
     </p:spTree>
     <p:extLst>
       <p:ext uri="{BB962C8B-B14F-4D97-AF65-F5344CB8AC3E}">

</xml_diff>